<commit_message>
TW edits for diagram and service name
</commit_message>
<xml_diff>
--- a/docs/deployment_guide/images/quickstart-ibm-mq-eks-architecture-diagram.pptx
+++ b/docs/deployment_guide/images/quickstart-ibm-mq-eks-architecture-diagram.pptx
@@ -3775,8 +3775,8 @@
         </p:nvSpPr>
         <p:spPr>
           <a:xfrm>
-            <a:off x="2066547" y="2128041"/>
-            <a:ext cx="2229407" cy="2037783"/>
+            <a:off x="2066547" y="2286000"/>
+            <a:ext cx="2229407" cy="1920240"/>
           </a:xfrm>
           <a:prstGeom prst="rect">
             <a:avLst/>
@@ -3876,7 +3876,7 @@
         </p:blipFill>
         <p:spPr>
           <a:xfrm>
-            <a:off x="2066547" y="2128043"/>
+            <a:off x="2066547" y="2286000"/>
             <a:ext cx="381000" cy="381000"/>
           </a:xfrm>
           <a:prstGeom prst="rect">
@@ -3900,8 +3900,8 @@
         </p:nvSpPr>
         <p:spPr bwMode="auto">
           <a:xfrm>
-            <a:off x="2131005" y="2979017"/>
-            <a:ext cx="2090060" cy="261610"/>
+            <a:off x="2632610" y="3090645"/>
+            <a:ext cx="1097280" cy="261610"/>
           </a:xfrm>
           <a:prstGeom prst="rect">
             <a:avLst/>
@@ -4099,7 +4099,7 @@
         </p:blipFill>
         <p:spPr bwMode="auto">
           <a:xfrm>
-            <a:off x="2947435" y="2509043"/>
+            <a:off x="2947435" y="2651760"/>
             <a:ext cx="457200" cy="457200"/>
           </a:xfrm>
           <a:prstGeom prst="rect">
@@ -4282,7 +4282,7 @@
         </p:blipFill>
         <p:spPr bwMode="auto">
           <a:xfrm>
-            <a:off x="2947435" y="3343930"/>
+            <a:off x="2947435" y="3520440"/>
             <a:ext cx="457200" cy="457200"/>
           </a:xfrm>
           <a:prstGeom prst="rect">
@@ -4329,8 +4329,8 @@
         </p:nvSpPr>
         <p:spPr bwMode="auto">
           <a:xfrm>
-            <a:off x="2742790" y="3811514"/>
-            <a:ext cx="866491" cy="261610"/>
+            <a:off x="2797058" y="3931920"/>
+            <a:ext cx="731520" cy="261610"/>
           </a:xfrm>
           <a:prstGeom prst="rect">
             <a:avLst/>
@@ -4716,8 +4716,8 @@
         </p:nvSpPr>
         <p:spPr>
           <a:xfrm>
-            <a:off x="6096813" y="2128042"/>
-            <a:ext cx="2231136" cy="2008758"/>
+            <a:off x="6096813" y="2286000"/>
+            <a:ext cx="2231136" cy="1920240"/>
           </a:xfrm>
           <a:prstGeom prst="rect">
             <a:avLst/>
@@ -4817,7 +4817,7 @@
         </p:blipFill>
         <p:spPr>
           <a:xfrm>
-            <a:off x="6096812" y="2128043"/>
+            <a:off x="6096812" y="2286000"/>
             <a:ext cx="381000" cy="381000"/>
           </a:xfrm>
           <a:prstGeom prst="rect">
@@ -4841,8 +4841,8 @@
         </p:nvSpPr>
         <p:spPr bwMode="auto">
           <a:xfrm>
-            <a:off x="6165822" y="2979017"/>
-            <a:ext cx="2090060" cy="261610"/>
+            <a:off x="6652784" y="3090672"/>
+            <a:ext cx="1097280" cy="261610"/>
           </a:xfrm>
           <a:prstGeom prst="rect">
             <a:avLst/>
@@ -5040,7 +5040,7 @@
         </p:blipFill>
         <p:spPr bwMode="auto">
           <a:xfrm>
-            <a:off x="6982252" y="2509043"/>
+            <a:off x="6982252" y="2651760"/>
             <a:ext cx="457200" cy="457200"/>
           </a:xfrm>
           <a:prstGeom prst="rect">
@@ -5563,7 +5563,7 @@
         <p:spPr>
           <a:xfrm>
             <a:off x="1722286" y="4843826"/>
-            <a:ext cx="10097182" cy="2926080"/>
+            <a:ext cx="10058400" cy="2926080"/>
           </a:xfrm>
           <a:prstGeom prst="rect">
             <a:avLst/>
@@ -6482,8 +6482,8 @@
         </p:nvSpPr>
         <p:spPr>
           <a:xfrm>
-            <a:off x="9212802" y="2128042"/>
-            <a:ext cx="2231136" cy="2008758"/>
+            <a:off x="9212802" y="2286000"/>
+            <a:ext cx="2231136" cy="1920240"/>
           </a:xfrm>
           <a:prstGeom prst="rect">
             <a:avLst/>
@@ -6583,7 +6583,7 @@
         </p:blipFill>
         <p:spPr>
           <a:xfrm>
-            <a:off x="9212801" y="2128043"/>
+            <a:off x="9212801" y="2286000"/>
             <a:ext cx="381000" cy="381000"/>
           </a:xfrm>
           <a:prstGeom prst="rect">
@@ -6607,8 +6607,8 @@
         </p:nvSpPr>
         <p:spPr bwMode="auto">
           <a:xfrm>
-            <a:off x="9281811" y="2979017"/>
-            <a:ext cx="2090060" cy="261610"/>
+            <a:off x="9764959" y="3090645"/>
+            <a:ext cx="1097280" cy="261610"/>
           </a:xfrm>
           <a:prstGeom prst="rect">
             <a:avLst/>
@@ -6806,7 +6806,7 @@
         </p:blipFill>
         <p:spPr bwMode="auto">
           <a:xfrm>
-            <a:off x="10098241" y="2509043"/>
+            <a:off x="10098241" y="2651760"/>
             <a:ext cx="457200" cy="457200"/>
           </a:xfrm>
           <a:prstGeom prst="rect">

</xml_diff>

<commit_message>
TW edits for diagram and bullet
</commit_message>
<xml_diff>
--- a/docs/deployment_guide/images/quickstart-ibm-mq-eks-architecture-diagram.pptx
+++ b/docs/deployment_guide/images/quickstart-ibm-mq-eks-architecture-diagram.pptx
@@ -206,7 +206,7 @@
           <a:p>
             <a:fld id="{3D24F5CC-F88F-2E40-B1E3-1BEBDB4FB352}" type="datetimeFigureOut">
               <a:rPr lang="en-US" smtClean="0"/>
-              <a:t>3/15/2023</a:t>
+              <a:t>3/16/2023</a:t>
             </a:fld>
             <a:endParaRPr lang="en-US" dirty="0"/>
           </a:p>
@@ -748,7 +748,7 @@
           <a:p>
             <a:fld id="{42CEB043-CB07-4D88-96C7-E080C34C29C0}" type="datetimeFigureOut">
               <a:rPr lang="en-US" smtClean="0"/>
-              <a:t>3/15/2023</a:t>
+              <a:t>3/16/2023</a:t>
             </a:fld>
             <a:endParaRPr lang="en-US" dirty="0"/>
           </a:p>
@@ -918,7 +918,7 @@
           <a:p>
             <a:fld id="{42CEB043-CB07-4D88-96C7-E080C34C29C0}" type="datetimeFigureOut">
               <a:rPr lang="en-US" smtClean="0"/>
-              <a:t>3/15/2023</a:t>
+              <a:t>3/16/2023</a:t>
             </a:fld>
             <a:endParaRPr lang="en-US" dirty="0"/>
           </a:p>
@@ -1098,7 +1098,7 @@
           <a:p>
             <a:fld id="{42CEB043-CB07-4D88-96C7-E080C34C29C0}" type="datetimeFigureOut">
               <a:rPr lang="en-US" smtClean="0"/>
-              <a:t>3/15/2023</a:t>
+              <a:t>3/16/2023</a:t>
             </a:fld>
             <a:endParaRPr lang="en-US" dirty="0"/>
           </a:p>
@@ -1268,7 +1268,7 @@
           <a:p>
             <a:fld id="{42CEB043-CB07-4D88-96C7-E080C34C29C0}" type="datetimeFigureOut">
               <a:rPr lang="en-US" smtClean="0"/>
-              <a:t>3/15/2023</a:t>
+              <a:t>3/16/2023</a:t>
             </a:fld>
             <a:endParaRPr lang="en-US" dirty="0"/>
           </a:p>
@@ -1512,7 +1512,7 @@
           <a:p>
             <a:fld id="{42CEB043-CB07-4D88-96C7-E080C34C29C0}" type="datetimeFigureOut">
               <a:rPr lang="en-US" smtClean="0"/>
-              <a:t>3/15/2023</a:t>
+              <a:t>3/16/2023</a:t>
             </a:fld>
             <a:endParaRPr lang="en-US" dirty="0"/>
           </a:p>
@@ -1744,7 +1744,7 @@
           <a:p>
             <a:fld id="{42CEB043-CB07-4D88-96C7-E080C34C29C0}" type="datetimeFigureOut">
               <a:rPr lang="en-US" smtClean="0"/>
-              <a:t>3/15/2023</a:t>
+              <a:t>3/16/2023</a:t>
             </a:fld>
             <a:endParaRPr lang="en-US" dirty="0"/>
           </a:p>
@@ -2111,7 +2111,7 @@
           <a:p>
             <a:fld id="{42CEB043-CB07-4D88-96C7-E080C34C29C0}" type="datetimeFigureOut">
               <a:rPr lang="en-US" smtClean="0"/>
-              <a:t>3/15/2023</a:t>
+              <a:t>3/16/2023</a:t>
             </a:fld>
             <a:endParaRPr lang="en-US" dirty="0"/>
           </a:p>
@@ -2229,7 +2229,7 @@
           <a:p>
             <a:fld id="{42CEB043-CB07-4D88-96C7-E080C34C29C0}" type="datetimeFigureOut">
               <a:rPr lang="en-US" smtClean="0"/>
-              <a:t>3/15/2023</a:t>
+              <a:t>3/16/2023</a:t>
             </a:fld>
             <a:endParaRPr lang="en-US" dirty="0"/>
           </a:p>
@@ -2324,7 +2324,7 @@
           <a:p>
             <a:fld id="{42CEB043-CB07-4D88-96C7-E080C34C29C0}" type="datetimeFigureOut">
               <a:rPr lang="en-US" smtClean="0"/>
-              <a:t>3/15/2023</a:t>
+              <a:t>3/16/2023</a:t>
             </a:fld>
             <a:endParaRPr lang="en-US" dirty="0"/>
           </a:p>
@@ -2601,7 +2601,7 @@
           <a:p>
             <a:fld id="{42CEB043-CB07-4D88-96C7-E080C34C29C0}" type="datetimeFigureOut">
               <a:rPr lang="en-US" smtClean="0"/>
-              <a:t>3/15/2023</a:t>
+              <a:t>3/16/2023</a:t>
             </a:fld>
             <a:endParaRPr lang="en-US" dirty="0"/>
           </a:p>
@@ -2857,7 +2857,7 @@
           <a:p>
             <a:fld id="{42CEB043-CB07-4D88-96C7-E080C34C29C0}" type="datetimeFigureOut">
               <a:rPr lang="en-US" smtClean="0"/>
-              <a:t>3/15/2023</a:t>
+              <a:t>3/16/2023</a:t>
             </a:fld>
             <a:endParaRPr lang="en-US" dirty="0"/>
           </a:p>
@@ -3070,7 +3070,7 @@
           <a:p>
             <a:fld id="{42CEB043-CB07-4D88-96C7-E080C34C29C0}" type="datetimeFigureOut">
               <a:rPr lang="en-US" smtClean="0"/>
-              <a:t>3/15/2023</a:t>
+              <a:t>3/16/2023</a:t>
             </a:fld>
             <a:endParaRPr lang="en-US" dirty="0"/>
           </a:p>
@@ -5605,35 +5605,13 @@
               </a:spcAft>
               <a:defRPr/>
             </a:pPr>
-            <a:r>
-              <a:rPr lang="en-US" sz="1200" dirty="0">
-                <a:solidFill>
-                  <a:srgbClr val="5A6B86"/>
-                </a:solidFill>
-                <a:latin typeface="Arial" panose="020B0604020202020204" pitchFamily="34" charset="0"/>
-                <a:cs typeface="Arial" panose="020B0604020202020204" pitchFamily="34" charset="0"/>
-              </a:rPr>
-              <a:t>EKS managed</a:t>
-            </a:r>
-            <a:br>
-              <a:rPr lang="en-US" sz="1200" dirty="0">
-                <a:solidFill>
-                  <a:srgbClr val="5A6B86"/>
-                </a:solidFill>
-                <a:latin typeface="Arial" panose="020B0604020202020204" pitchFamily="34" charset="0"/>
-                <a:cs typeface="Arial" panose="020B0604020202020204" pitchFamily="34" charset="0"/>
-              </a:rPr>
-            </a:br>
-            <a:r>
-              <a:rPr lang="en-US" sz="1200" dirty="0">
-                <a:solidFill>
-                  <a:srgbClr val="5A6B86"/>
-                </a:solidFill>
-                <a:latin typeface="Arial" panose="020B0604020202020204" pitchFamily="34" charset="0"/>
-                <a:cs typeface="Arial" panose="020B0604020202020204" pitchFamily="34" charset="0"/>
-              </a:rPr>
-              <a:t>node group</a:t>
-            </a:r>
+            <a:endParaRPr lang="en-US" sz="1200" dirty="0">
+              <a:solidFill>
+                <a:srgbClr val="5A6B86"/>
+              </a:solidFill>
+              <a:latin typeface="Arial" panose="020B0604020202020204" pitchFamily="34" charset="0"/>
+              <a:cs typeface="Arial" panose="020B0604020202020204" pitchFamily="34" charset="0"/>
+            </a:endParaRPr>
           </a:p>
         </p:txBody>
       </p:sp>
@@ -6463,7 +6441,7 @@
                 <a:ea typeface="+mn-ea"/>
                 <a:cs typeface="Arial" panose="020B0604020202020204" pitchFamily="34" charset="0"/>
               </a:rPr>
-              <a:t>Availability Zone 2</a:t>
+              <a:t>Availability Zone 3</a:t>
             </a:r>
           </a:p>
         </p:txBody>
@@ -8030,57 +8008,12 @@
           </a:prstGeom>
         </p:spPr>
       </p:pic>
-      <p:cxnSp>
-        <p:nvCxnSpPr>
-          <p:cNvPr id="60" name="Straight Arrow Connector 59">
+      <p:sp>
+        <p:nvSpPr>
+          <p:cNvPr id="59" name="TextBox 58">
             <a:extLst>
               <a:ext uri="{FF2B5EF4-FFF2-40B4-BE49-F238E27FC236}">
-                <a16:creationId xmlns:a16="http://schemas.microsoft.com/office/drawing/2014/main" id="{7C880991-AAA4-450A-97AF-F5FE7D31E735}"/>
-              </a:ext>
-            </a:extLst>
-          </p:cNvPr>
-          <p:cNvCxnSpPr>
-            <a:cxnSpLocks/>
-          </p:cNvCxnSpPr>
-          <p:nvPr/>
-        </p:nvCxnSpPr>
-        <p:spPr>
-          <a:xfrm>
-            <a:off x="3108960" y="6217920"/>
-            <a:ext cx="7315200" cy="0"/>
-          </a:xfrm>
-          <a:prstGeom prst="straightConnector1">
-            <a:avLst/>
-          </a:prstGeom>
-          <a:ln w="12700">
-            <a:solidFill>
-              <a:srgbClr val="545B64"/>
-            </a:solidFill>
-            <a:headEnd type="arrow" w="med" len="sm"/>
-            <a:tailEnd type="arrow" w="med" len="sm"/>
-          </a:ln>
-        </p:spPr>
-        <p:style>
-          <a:lnRef idx="1">
-            <a:schemeClr val="accent1"/>
-          </a:lnRef>
-          <a:fillRef idx="0">
-            <a:schemeClr val="accent1"/>
-          </a:fillRef>
-          <a:effectRef idx="0">
-            <a:schemeClr val="accent1"/>
-          </a:effectRef>
-          <a:fontRef idx="minor">
-            <a:schemeClr val="tx1"/>
-          </a:fontRef>
-        </p:style>
-      </p:cxnSp>
-      <p:sp>
-        <p:nvSpPr>
-          <p:cNvPr id="37" name="TextBox 36">
-            <a:extLst>
-              <a:ext uri="{FF2B5EF4-FFF2-40B4-BE49-F238E27FC236}">
-                <a16:creationId xmlns:a16="http://schemas.microsoft.com/office/drawing/2014/main" id="{68A1D347-522D-E7DE-054D-F69252396050}"/>
+                <a16:creationId xmlns:a16="http://schemas.microsoft.com/office/drawing/2014/main" id="{3DB4899B-D821-46AB-BCC6-E38C3D642C3B}"/>
               </a:ext>
             </a:extLst>
           </p:cNvPr>
@@ -8089,8 +8022,8 @@
         </p:nvSpPr>
         <p:spPr>
           <a:xfrm>
-            <a:off x="4617720" y="5943600"/>
-            <a:ext cx="1188720" cy="615553"/>
+            <a:off x="4617720" y="4952164"/>
+            <a:ext cx="1097280" cy="430887"/>
           </a:xfrm>
           <a:prstGeom prst="rect">
             <a:avLst/>
@@ -8105,26 +8038,43 @@
           </a:bodyPr>
           <a:lstStyle/>
           <a:p>
-            <a:r>
-              <a:rPr lang="en-US" sz="1100" i="1" dirty="0">
+            <a:pPr algn="ctr" eaLnBrk="1" fontAlgn="auto" hangingPunct="1">
+              <a:spcBef>
+                <a:spcPts val="0"/>
+              </a:spcBef>
+              <a:spcAft>
+                <a:spcPts val="0"/>
+              </a:spcAft>
+              <a:defRPr/>
+            </a:pPr>
+            <a:r>
+              <a:rPr lang="en-US" sz="1100" dirty="0">
+                <a:solidFill>
+                  <a:srgbClr val="5A6B86"/>
+                </a:solidFill>
                 <a:latin typeface="Arial" panose="020B0604020202020204" pitchFamily="34" charset="0"/>
                 <a:cs typeface="Arial" panose="020B0604020202020204" pitchFamily="34" charset="0"/>
               </a:rPr>
-              <a:t>Native HA data </a:t>
-            </a:r>
-            <a:r>
-              <a:rPr lang="en-US" sz="1200" i="1" dirty="0">
+              <a:t>EKS managed</a:t>
+            </a:r>
+            <a:br>
+              <a:rPr lang="en-US" sz="1100" dirty="0">
+                <a:solidFill>
+                  <a:srgbClr val="5A6B86"/>
+                </a:solidFill>
                 <a:latin typeface="Arial" panose="020B0604020202020204" pitchFamily="34" charset="0"/>
                 <a:cs typeface="Arial" panose="020B0604020202020204" pitchFamily="34" charset="0"/>
               </a:rPr>
-              <a:t>replication</a:t>
-            </a:r>
-            <a:r>
-              <a:rPr lang="en-US" sz="1100" i="1" dirty="0">
+            </a:br>
+            <a:r>
+              <a:rPr lang="en-US" sz="1100" dirty="0">
+                <a:solidFill>
+                  <a:srgbClr val="5A6B86"/>
+                </a:solidFill>
                 <a:latin typeface="Arial" panose="020B0604020202020204" pitchFamily="34" charset="0"/>
                 <a:cs typeface="Arial" panose="020B0604020202020204" pitchFamily="34" charset="0"/>
               </a:rPr>
-              <a:t> and availability</a:t>
+              <a:t>node group</a:t>
             </a:r>
           </a:p>
         </p:txBody>

</xml_diff>